<commit_message>
Aggiornata la prima slide
</commit_message>
<xml_diff>
--- a/Presentazione sistemata.pptx
+++ b/Presentazione sistemata.pptx
@@ -143,13 +143,45 @@
 <file path=ppt/revisionInfo.xml><?xml version="1.0" encoding="utf-8"?>
 <p1510:revInfo xmlns:a="http://schemas.openxmlformats.org/drawingml/2006/main" xmlns:r="http://schemas.openxmlformats.org/officeDocument/2006/relationships" xmlns:p1510="http://schemas.microsoft.com/office/powerpoint/2015/10/main">
   <p1510:revLst>
-    <p1510:client id="{DAADE250-68AD-477C-B7A4-80E27BD55A77}" v="39" dt="2019-10-09T18:47:18.045"/>
+    <p1510:client id="{5F41118D-A46A-4BCB-B31B-F83832F54457}" v="1" dt="2019-10-17T12:22:43.430"/>
   </p1510:revLst>
 </p1510:revInfo>
 </file>
 
 <file path=ppt/changesInfos/changesInfo1.xml><?xml version="1.0" encoding="utf-8"?>
 <pc:chgInfo xmlns:a="http://schemas.openxmlformats.org/drawingml/2006/main" xmlns:r="http://schemas.openxmlformats.org/officeDocument/2006/relationships" xmlns:ac="http://schemas.microsoft.com/office/drawing/2013/main/command" xmlns:pc="http://schemas.microsoft.com/office/powerpoint/2013/main/command">
+  <pc:docChgLst>
+    <pc:chgData name="Andrei Daniel Ivan" userId="d3c4cde5a19fb9a3" providerId="LiveId" clId="{5F41118D-A46A-4BCB-B31B-F83832F54457}"/>
+    <pc:docChg chg="custSel modSld">
+      <pc:chgData name="Andrei Daniel Ivan" userId="d3c4cde5a19fb9a3" providerId="LiveId" clId="{5F41118D-A46A-4BCB-B31B-F83832F54457}" dt="2019-10-17T12:25:06.306" v="143" actId="1076"/>
+      <pc:docMkLst>
+        <pc:docMk/>
+      </pc:docMkLst>
+      <pc:sldChg chg="modSp">
+        <pc:chgData name="Andrei Daniel Ivan" userId="d3c4cde5a19fb9a3" providerId="LiveId" clId="{5F41118D-A46A-4BCB-B31B-F83832F54457}" dt="2019-10-17T12:25:06.306" v="143" actId="1076"/>
+        <pc:sldMkLst>
+          <pc:docMk/>
+          <pc:sldMk cId="2617522827" sldId="259"/>
+        </pc:sldMkLst>
+        <pc:spChg chg="mod">
+          <ac:chgData name="Andrei Daniel Ivan" userId="d3c4cde5a19fb9a3" providerId="LiveId" clId="{5F41118D-A46A-4BCB-B31B-F83832F54457}" dt="2019-10-17T12:24:56.663" v="141" actId="20577"/>
+          <ac:spMkLst>
+            <pc:docMk/>
+            <pc:sldMk cId="2617522827" sldId="259"/>
+            <ac:spMk id="7" creationId="{EE01FA61-8462-4AFC-BE72-063FF8D343E8}"/>
+          </ac:spMkLst>
+        </pc:spChg>
+        <pc:spChg chg="mod">
+          <ac:chgData name="Andrei Daniel Ivan" userId="d3c4cde5a19fb9a3" providerId="LiveId" clId="{5F41118D-A46A-4BCB-B31B-F83832F54457}" dt="2019-10-17T12:25:06.306" v="143" actId="1076"/>
+          <ac:spMkLst>
+            <pc:docMk/>
+            <pc:sldMk cId="2617522827" sldId="259"/>
+            <ac:spMk id="8" creationId="{F49C932E-42CB-401A-B8E1-89A251888411}"/>
+          </ac:spMkLst>
+        </pc:spChg>
+      </pc:sldChg>
+    </pc:docChg>
+  </pc:docChgLst>
   <pc:docChgLst>
     <pc:chgData name="Andrei Daniel Ivan" userId="d3c4cde5a19fb9a3" providerId="LiveId" clId="{A6A77833-C58B-4237-AD71-6D723E100C6B}"/>
     <pc:docChg chg="modSld">
@@ -3887,13 +3919,13 @@
         </p:nvSpPr>
         <p:spPr>
           <a:xfrm>
-            <a:off x="871870" y="1184055"/>
-            <a:ext cx="10515600" cy="4351338"/>
+            <a:off x="871870" y="1184054"/>
+            <a:ext cx="10515600" cy="5172295"/>
           </a:xfrm>
         </p:spPr>
         <p:txBody>
           <a:bodyPr>
-            <a:normAutofit/>
+            <a:normAutofit fontScale="25000" lnSpcReduction="20000"/>
           </a:bodyPr>
           <a:lstStyle/>
           <a:p>
@@ -3901,13 +3933,13 @@
               <a:buNone/>
             </a:pPr>
             <a:r>
-              <a:rPr lang="it-IT" sz="1600" dirty="0" err="1">
+              <a:rPr lang="it-IT" sz="4800" dirty="0" err="1">
                 <a:latin typeface="Consolas" panose="020B0609020204030204" pitchFamily="49" charset="0"/>
               </a:rPr>
               <a:t>try</a:t>
             </a:r>
             <a:r>
-              <a:rPr lang="it-IT" sz="1600" dirty="0">
+              <a:rPr lang="it-IT" sz="4800" dirty="0">
                 <a:latin typeface="Consolas" panose="020B0609020204030204" pitchFamily="49" charset="0"/>
               </a:rPr>
               <a:t> {</a:t>
@@ -3918,31 +3950,31 @@
               <a:buNone/>
             </a:pPr>
             <a:r>
-              <a:rPr lang="it-IT" sz="1600" dirty="0">
+              <a:rPr lang="it-IT" sz="4800" dirty="0">
                 <a:latin typeface="Consolas" panose="020B0609020204030204" pitchFamily="49" charset="0"/>
               </a:rPr>
               <a:t>	</a:t>
             </a:r>
             <a:r>
-              <a:rPr lang="it-IT" sz="1600" dirty="0" err="1">
+              <a:rPr lang="it-IT" sz="4800" dirty="0" err="1">
                 <a:latin typeface="Consolas" panose="020B0609020204030204" pitchFamily="49" charset="0"/>
               </a:rPr>
               <a:t>socket</a:t>
             </a:r>
             <a:r>
-              <a:rPr lang="it-IT" sz="1600" dirty="0">
+              <a:rPr lang="it-IT" sz="4800" dirty="0">
                 <a:latin typeface="Consolas" panose="020B0609020204030204" pitchFamily="49" charset="0"/>
               </a:rPr>
               <a:t> = new </a:t>
             </a:r>
             <a:r>
-              <a:rPr lang="it-IT" sz="1600" dirty="0" err="1">
+              <a:rPr lang="it-IT" sz="4800" dirty="0" err="1">
                 <a:latin typeface="Consolas" panose="020B0609020204030204" pitchFamily="49" charset="0"/>
               </a:rPr>
               <a:t>DatagramSocket</a:t>
             </a:r>
             <a:r>
-              <a:rPr lang="it-IT" sz="1600" dirty="0">
+              <a:rPr lang="it-IT" sz="4800" dirty="0">
                 <a:latin typeface="Consolas" panose="020B0609020204030204" pitchFamily="49" charset="0"/>
               </a:rPr>
               <a:t>();</a:t>
@@ -3953,19 +3985,19 @@
               <a:buNone/>
             </a:pPr>
             <a:r>
-              <a:rPr lang="it-IT" sz="1600" dirty="0">
+              <a:rPr lang="it-IT" sz="4800" dirty="0">
                 <a:latin typeface="Consolas" panose="020B0609020204030204" pitchFamily="49" charset="0"/>
               </a:rPr>
               <a:t>	</a:t>
             </a:r>
             <a:r>
-              <a:rPr lang="it-IT" sz="1600" dirty="0" err="1">
+              <a:rPr lang="it-IT" sz="4800" dirty="0" err="1">
                 <a:latin typeface="Consolas" panose="020B0609020204030204" pitchFamily="49" charset="0"/>
               </a:rPr>
               <a:t>socket.setSoTimeout</a:t>
             </a:r>
             <a:r>
-              <a:rPr lang="it-IT" sz="1600" dirty="0">
+              <a:rPr lang="it-IT" sz="4800" dirty="0">
                 <a:latin typeface="Consolas" panose="020B0609020204030204" pitchFamily="49" charset="0"/>
               </a:rPr>
               <a:t>(30000);</a:t>
@@ -3976,67 +4008,67 @@
               <a:buNone/>
             </a:pPr>
             <a:r>
-              <a:rPr lang="it-IT" sz="1600" dirty="0">
+              <a:rPr lang="it-IT" sz="4800" dirty="0">
                 <a:latin typeface="Consolas" panose="020B0609020204030204" pitchFamily="49" charset="0"/>
               </a:rPr>
               <a:t>	</a:t>
             </a:r>
             <a:r>
-              <a:rPr lang="it-IT" sz="1600" dirty="0" err="1">
+              <a:rPr lang="it-IT" sz="4800" dirty="0" err="1">
                 <a:latin typeface="Consolas" panose="020B0609020204030204" pitchFamily="49" charset="0"/>
               </a:rPr>
               <a:t>packet</a:t>
             </a:r>
             <a:r>
-              <a:rPr lang="it-IT" sz="1600" dirty="0">
+              <a:rPr lang="it-IT" sz="4800" dirty="0">
                 <a:latin typeface="Consolas" panose="020B0609020204030204" pitchFamily="49" charset="0"/>
               </a:rPr>
               <a:t> = new </a:t>
             </a:r>
             <a:r>
-              <a:rPr lang="it-IT" sz="1600" dirty="0" err="1">
+              <a:rPr lang="it-IT" sz="4800" dirty="0" err="1">
                 <a:latin typeface="Consolas" panose="020B0609020204030204" pitchFamily="49" charset="0"/>
               </a:rPr>
               <a:t>DatagramPacket</a:t>
             </a:r>
             <a:r>
-              <a:rPr lang="it-IT" sz="1600" dirty="0">
+              <a:rPr lang="it-IT" sz="4800" dirty="0">
                 <a:latin typeface="Consolas" panose="020B0609020204030204" pitchFamily="49" charset="0"/>
               </a:rPr>
               <a:t>(</a:t>
             </a:r>
             <a:r>
-              <a:rPr lang="it-IT" sz="1600" dirty="0" err="1">
+              <a:rPr lang="it-IT" sz="4800" dirty="0" err="1">
                 <a:latin typeface="Consolas" panose="020B0609020204030204" pitchFamily="49" charset="0"/>
               </a:rPr>
               <a:t>buf</a:t>
             </a:r>
             <a:r>
-              <a:rPr lang="it-IT" sz="1600" dirty="0">
+              <a:rPr lang="it-IT" sz="4800" dirty="0">
                 <a:latin typeface="Consolas" panose="020B0609020204030204" pitchFamily="49" charset="0"/>
               </a:rPr>
               <a:t>, </a:t>
             </a:r>
             <a:r>
-              <a:rPr lang="it-IT" sz="1600" dirty="0" err="1">
+              <a:rPr lang="it-IT" sz="4800" dirty="0" err="1">
                 <a:latin typeface="Consolas" panose="020B0609020204030204" pitchFamily="49" charset="0"/>
               </a:rPr>
               <a:t>buf.length</a:t>
             </a:r>
             <a:r>
-              <a:rPr lang="it-IT" sz="1600" dirty="0">
+              <a:rPr lang="it-IT" sz="4800" dirty="0">
                 <a:latin typeface="Consolas" panose="020B0609020204030204" pitchFamily="49" charset="0"/>
               </a:rPr>
               <a:t>, </a:t>
             </a:r>
             <a:r>
-              <a:rPr lang="it-IT" sz="1600" dirty="0" err="1">
+              <a:rPr lang="it-IT" sz="4800" dirty="0" err="1">
                 <a:latin typeface="Consolas" panose="020B0609020204030204" pitchFamily="49" charset="0"/>
               </a:rPr>
               <a:t>addr</a:t>
             </a:r>
             <a:r>
-              <a:rPr lang="it-IT" sz="1600" dirty="0">
+              <a:rPr lang="it-IT" sz="4800" dirty="0">
                 <a:latin typeface="Consolas" panose="020B0609020204030204" pitchFamily="49" charset="0"/>
               </a:rPr>
               <a:t>, port);</a:t>
@@ -4047,31 +4079,31 @@
               <a:buNone/>
             </a:pPr>
             <a:r>
-              <a:rPr lang="it-IT" sz="1600" dirty="0">
+              <a:rPr lang="it-IT" sz="4800" dirty="0">
                 <a:latin typeface="Consolas" panose="020B0609020204030204" pitchFamily="49" charset="0"/>
               </a:rPr>
               <a:t>	</a:t>
             </a:r>
             <a:r>
-              <a:rPr lang="it-IT" sz="1600" dirty="0" err="1">
+              <a:rPr lang="it-IT" sz="4800" dirty="0" err="1">
                 <a:latin typeface="Consolas" panose="020B0609020204030204" pitchFamily="49" charset="0"/>
               </a:rPr>
               <a:t>System.out.println</a:t>
             </a:r>
             <a:r>
-              <a:rPr lang="it-IT" sz="1600" dirty="0">
+              <a:rPr lang="it-IT" sz="4800" dirty="0">
                 <a:latin typeface="Consolas" panose="020B0609020204030204" pitchFamily="49" charset="0"/>
               </a:rPr>
               <a:t>("\</a:t>
             </a:r>
             <a:r>
-              <a:rPr lang="it-IT" sz="1600" dirty="0" err="1">
+              <a:rPr lang="it-IT" sz="4800" dirty="0" err="1">
                 <a:latin typeface="Consolas" panose="020B0609020204030204" pitchFamily="49" charset="0"/>
               </a:rPr>
               <a:t>nRSClient</a:t>
             </a:r>
             <a:r>
-              <a:rPr lang="it-IT" sz="1600" dirty="0">
+              <a:rPr lang="it-IT" sz="4800" dirty="0">
                 <a:latin typeface="Consolas" panose="020B0609020204030204" pitchFamily="49" charset="0"/>
               </a:rPr>
               <a:t>: avviato");</a:t>
@@ -4082,43 +4114,43 @@
               <a:buNone/>
             </a:pPr>
             <a:r>
-              <a:rPr lang="it-IT" sz="1600" dirty="0">
+              <a:rPr lang="it-IT" sz="4800" dirty="0">
                 <a:latin typeface="Consolas" panose="020B0609020204030204" pitchFamily="49" charset="0"/>
               </a:rPr>
               <a:t>	</a:t>
             </a:r>
             <a:r>
-              <a:rPr lang="it-IT" sz="1600" dirty="0" err="1">
+              <a:rPr lang="it-IT" sz="4800" dirty="0" err="1">
                 <a:latin typeface="Consolas" panose="020B0609020204030204" pitchFamily="49" charset="0"/>
               </a:rPr>
               <a:t>System.out.println</a:t>
             </a:r>
             <a:r>
-              <a:rPr lang="it-IT" sz="1600" dirty="0">
+              <a:rPr lang="it-IT" sz="4800" dirty="0">
                 <a:latin typeface="Consolas" panose="020B0609020204030204" pitchFamily="49" charset="0"/>
               </a:rPr>
               <a:t>("Creata la </a:t>
             </a:r>
             <a:r>
-              <a:rPr lang="it-IT" sz="1600" dirty="0" err="1">
+              <a:rPr lang="it-IT" sz="4800" dirty="0" err="1">
                 <a:latin typeface="Consolas" panose="020B0609020204030204" pitchFamily="49" charset="0"/>
               </a:rPr>
               <a:t>socket</a:t>
             </a:r>
             <a:r>
-              <a:rPr lang="it-IT" sz="1600" dirty="0">
+              <a:rPr lang="it-IT" sz="4800" dirty="0">
                 <a:latin typeface="Consolas" panose="020B0609020204030204" pitchFamily="49" charset="0"/>
               </a:rPr>
               <a:t>: " + </a:t>
             </a:r>
             <a:r>
-              <a:rPr lang="it-IT" sz="1600" dirty="0" err="1">
+              <a:rPr lang="it-IT" sz="4800" dirty="0" err="1">
                 <a:latin typeface="Consolas" panose="020B0609020204030204" pitchFamily="49" charset="0"/>
               </a:rPr>
               <a:t>socket</a:t>
             </a:r>
             <a:r>
-              <a:rPr lang="it-IT" sz="1600" dirty="0">
+              <a:rPr lang="it-IT" sz="4800" dirty="0">
                 <a:latin typeface="Consolas" panose="020B0609020204030204" pitchFamily="49" charset="0"/>
               </a:rPr>
               <a:t>);</a:t>
@@ -4129,19 +4161,19 @@
               <a:buNone/>
             </a:pPr>
             <a:r>
-              <a:rPr lang="it-IT" sz="1600" dirty="0">
+              <a:rPr lang="it-IT" sz="4800" dirty="0">
                 <a:latin typeface="Consolas" panose="020B0609020204030204" pitchFamily="49" charset="0"/>
               </a:rPr>
               <a:t>} catch (</a:t>
             </a:r>
             <a:r>
-              <a:rPr lang="it-IT" sz="1600" dirty="0" err="1">
+              <a:rPr lang="it-IT" sz="4800" dirty="0" err="1">
                 <a:latin typeface="Consolas" panose="020B0609020204030204" pitchFamily="49" charset="0"/>
               </a:rPr>
               <a:t>SocketException</a:t>
             </a:r>
             <a:r>
-              <a:rPr lang="it-IT" sz="1600" dirty="0">
+              <a:rPr lang="it-IT" sz="4800" dirty="0">
                 <a:latin typeface="Consolas" panose="020B0609020204030204" pitchFamily="49" charset="0"/>
               </a:rPr>
               <a:t> e) {</a:t>
@@ -4152,31 +4184,31 @@
               <a:buNone/>
             </a:pPr>
             <a:r>
-              <a:rPr lang="it-IT" sz="1600" dirty="0">
+              <a:rPr lang="it-IT" sz="4800" dirty="0">
                 <a:latin typeface="Consolas" panose="020B0609020204030204" pitchFamily="49" charset="0"/>
               </a:rPr>
               <a:t>	</a:t>
             </a:r>
             <a:r>
-              <a:rPr lang="it-IT" sz="1600" dirty="0" err="1">
+              <a:rPr lang="it-IT" sz="4800" dirty="0" err="1">
                 <a:latin typeface="Consolas" panose="020B0609020204030204" pitchFamily="49" charset="0"/>
               </a:rPr>
               <a:t>System.out.println</a:t>
             </a:r>
             <a:r>
-              <a:rPr lang="it-IT" sz="1600" dirty="0">
+              <a:rPr lang="it-IT" sz="4800" dirty="0">
                 <a:latin typeface="Consolas" panose="020B0609020204030204" pitchFamily="49" charset="0"/>
               </a:rPr>
               <a:t>("Problemi nella creazione della </a:t>
             </a:r>
             <a:r>
-              <a:rPr lang="it-IT" sz="1600" dirty="0" err="1">
+              <a:rPr lang="it-IT" sz="4800" dirty="0" err="1">
                 <a:latin typeface="Consolas" panose="020B0609020204030204" pitchFamily="49" charset="0"/>
               </a:rPr>
               <a:t>socket</a:t>
             </a:r>
             <a:r>
-              <a:rPr lang="it-IT" sz="1600" dirty="0">
+              <a:rPr lang="it-IT" sz="4800" dirty="0">
                 <a:latin typeface="Consolas" panose="020B0609020204030204" pitchFamily="49" charset="0"/>
               </a:rPr>
               <a:t>: ");</a:t>
@@ -4187,19 +4219,19 @@
               <a:buNone/>
             </a:pPr>
             <a:r>
-              <a:rPr lang="it-IT" sz="1600" dirty="0">
+              <a:rPr lang="it-IT" sz="4800" dirty="0">
                 <a:latin typeface="Consolas" panose="020B0609020204030204" pitchFamily="49" charset="0"/>
               </a:rPr>
               <a:t>	</a:t>
             </a:r>
             <a:r>
-              <a:rPr lang="it-IT" sz="1600" dirty="0" err="1">
+              <a:rPr lang="it-IT" sz="4800" dirty="0" err="1">
                 <a:latin typeface="Consolas" panose="020B0609020204030204" pitchFamily="49" charset="0"/>
               </a:rPr>
               <a:t>e.printStackTrace</a:t>
             </a:r>
             <a:r>
-              <a:rPr lang="it-IT" sz="1600" dirty="0">
+              <a:rPr lang="it-IT" sz="4800" dirty="0">
                 <a:latin typeface="Consolas" panose="020B0609020204030204" pitchFamily="49" charset="0"/>
               </a:rPr>
               <a:t>();</a:t>
@@ -4210,31 +4242,31 @@
               <a:buNone/>
             </a:pPr>
             <a:r>
-              <a:rPr lang="it-IT" sz="1600" dirty="0">
+              <a:rPr lang="it-IT" sz="4800" dirty="0">
                 <a:latin typeface="Consolas" panose="020B0609020204030204" pitchFamily="49" charset="0"/>
               </a:rPr>
               <a:t>	</a:t>
             </a:r>
             <a:r>
-              <a:rPr lang="it-IT" sz="1600" dirty="0" err="1">
+              <a:rPr lang="it-IT" sz="4800" dirty="0" err="1">
                 <a:latin typeface="Consolas" panose="020B0609020204030204" pitchFamily="49" charset="0"/>
               </a:rPr>
               <a:t>System.out.println</a:t>
             </a:r>
             <a:r>
-              <a:rPr lang="it-IT" sz="1600" dirty="0">
+              <a:rPr lang="it-IT" sz="4800" dirty="0">
                 <a:latin typeface="Consolas" panose="020B0609020204030204" pitchFamily="49" charset="0"/>
               </a:rPr>
               <a:t>("</a:t>
             </a:r>
             <a:r>
-              <a:rPr lang="it-IT" sz="1600" dirty="0" err="1">
+              <a:rPr lang="it-IT" sz="4800" dirty="0" err="1">
                 <a:latin typeface="Consolas" panose="020B0609020204030204" pitchFamily="49" charset="0"/>
               </a:rPr>
               <a:t>RSClient</a:t>
             </a:r>
             <a:r>
-              <a:rPr lang="it-IT" sz="1600" dirty="0">
+              <a:rPr lang="it-IT" sz="4800" dirty="0">
                 <a:latin typeface="Consolas" panose="020B0609020204030204" pitchFamily="49" charset="0"/>
               </a:rPr>
               <a:t>: interrompo...");</a:t>
@@ -4245,19 +4277,19 @@
               <a:buNone/>
             </a:pPr>
             <a:r>
-              <a:rPr lang="it-IT" sz="1600" dirty="0">
+              <a:rPr lang="it-IT" sz="4800" dirty="0">
                 <a:latin typeface="Consolas" panose="020B0609020204030204" pitchFamily="49" charset="0"/>
               </a:rPr>
               <a:t>	</a:t>
             </a:r>
             <a:r>
-              <a:rPr lang="it-IT" sz="1600" dirty="0" err="1">
+              <a:rPr lang="it-IT" sz="4800" dirty="0" err="1">
                 <a:latin typeface="Consolas" panose="020B0609020204030204" pitchFamily="49" charset="0"/>
               </a:rPr>
               <a:t>System.exit</a:t>
             </a:r>
             <a:r>
-              <a:rPr lang="it-IT" sz="1600" dirty="0">
+              <a:rPr lang="it-IT" sz="4800" dirty="0">
                 <a:latin typeface="Consolas" panose="020B0609020204030204" pitchFamily="49" charset="0"/>
               </a:rPr>
               <a:t>(3);</a:t>
@@ -4268,7 +4300,182 @@
               <a:buNone/>
             </a:pPr>
             <a:r>
-              <a:rPr lang="it-IT" sz="1600" dirty="0">
+              <a:rPr lang="it-IT" sz="4800" dirty="0">
+                <a:latin typeface="Consolas" panose="020B0609020204030204" pitchFamily="49" charset="0"/>
+              </a:rPr>
+              <a:t>}</a:t>
+            </a:r>
+          </a:p>
+          <a:p>
+            <a:pPr marL="0" indent="0">
+              <a:buNone/>
+            </a:pPr>
+            <a:endParaRPr lang="it-IT" sz="4800" dirty="0">
+              <a:latin typeface="Consolas" panose="020B0609020204030204" pitchFamily="49" charset="0"/>
+            </a:endParaRPr>
+          </a:p>
+          <a:p>
+            <a:pPr marL="0" indent="0">
+              <a:buNone/>
+            </a:pPr>
+            <a:r>
+              <a:rPr lang="it-IT" sz="4800" dirty="0" err="1">
+                <a:latin typeface="Consolas" panose="020B0609020204030204" pitchFamily="49" charset="0"/>
+              </a:rPr>
+              <a:t>if</a:t>
+            </a:r>
+            <a:r>
+              <a:rPr lang="it-IT" sz="4800" dirty="0">
+                <a:latin typeface="Consolas" panose="020B0609020204030204" pitchFamily="49" charset="0"/>
+              </a:rPr>
+              <a:t> (res != -1) {</a:t>
+            </a:r>
+          </a:p>
+          <a:p>
+            <a:pPr marL="0" indent="0">
+              <a:buNone/>
+            </a:pPr>
+            <a:r>
+              <a:rPr lang="it-IT" sz="4800" dirty="0">
+                <a:latin typeface="Consolas" panose="020B0609020204030204" pitchFamily="49" charset="0"/>
+              </a:rPr>
+              <a:t>	</a:t>
+            </a:r>
+            <a:r>
+              <a:rPr lang="it-IT" sz="4800" dirty="0" err="1">
+                <a:latin typeface="Consolas" panose="020B0609020204030204" pitchFamily="49" charset="0"/>
+              </a:rPr>
+              <a:t>System.out.println</a:t>
+            </a:r>
+            <a:r>
+              <a:rPr lang="it-IT" sz="4800" dirty="0">
+                <a:latin typeface="Consolas" panose="020B0609020204030204" pitchFamily="49" charset="0"/>
+              </a:rPr>
+              <a:t>("Operazione svolta con successo");</a:t>
+            </a:r>
+          </a:p>
+          <a:p>
+            <a:pPr marL="0" indent="0">
+              <a:buNone/>
+            </a:pPr>
+            <a:r>
+              <a:rPr lang="it-IT" sz="4800" dirty="0">
+                <a:latin typeface="Consolas" panose="020B0609020204030204" pitchFamily="49" charset="0"/>
+              </a:rPr>
+              <a:t>	</a:t>
+            </a:r>
+            <a:r>
+              <a:rPr lang="it-IT" sz="4800" dirty="0" err="1">
+                <a:latin typeface="Consolas" panose="020B0609020204030204" pitchFamily="49" charset="0"/>
+              </a:rPr>
+              <a:t>System.out.print</a:t>
+            </a:r>
+            <a:r>
+              <a:rPr lang="it-IT" sz="4800" dirty="0">
+                <a:latin typeface="Consolas" panose="020B0609020204030204" pitchFamily="49" charset="0"/>
+              </a:rPr>
+              <a:t>("\</a:t>
+            </a:r>
+            <a:r>
+              <a:rPr lang="it-IT" sz="4800" dirty="0" err="1">
+                <a:latin typeface="Consolas" panose="020B0609020204030204" pitchFamily="49" charset="0"/>
+              </a:rPr>
+              <a:t>n^D</a:t>
+            </a:r>
+            <a:r>
+              <a:rPr lang="it-IT" sz="4800" dirty="0">
+                <a:latin typeface="Consolas" panose="020B0609020204030204" pitchFamily="49" charset="0"/>
+              </a:rPr>
+              <a:t>(Unix)/^Z(</a:t>
+            </a:r>
+            <a:r>
+              <a:rPr lang="it-IT" sz="4800" dirty="0" err="1">
+                <a:latin typeface="Consolas" panose="020B0609020204030204" pitchFamily="49" charset="0"/>
+              </a:rPr>
+              <a:t>Win</a:t>
+            </a:r>
+            <a:r>
+              <a:rPr lang="it-IT" sz="4800" dirty="0">
+                <a:latin typeface="Consolas" panose="020B0609020204030204" pitchFamily="49" charset="0"/>
+              </a:rPr>
+              <a:t>)+invio per uscire, altrimenti inserire prima riga da invertire: ");</a:t>
+            </a:r>
+          </a:p>
+          <a:p>
+            <a:pPr marL="0" indent="0">
+              <a:buNone/>
+            </a:pPr>
+            <a:r>
+              <a:rPr lang="it-IT" sz="4800" dirty="0">
+                <a:latin typeface="Consolas" panose="020B0609020204030204" pitchFamily="49" charset="0"/>
+              </a:rPr>
+              <a:t>} else {</a:t>
+            </a:r>
+          </a:p>
+          <a:p>
+            <a:pPr marL="0" indent="0">
+              <a:buNone/>
+            </a:pPr>
+            <a:r>
+              <a:rPr lang="it-IT" sz="4800" dirty="0">
+                <a:latin typeface="Consolas" panose="020B0609020204030204" pitchFamily="49" charset="0"/>
+              </a:rPr>
+              <a:t>	</a:t>
+            </a:r>
+            <a:r>
+              <a:rPr lang="it-IT" sz="4800" dirty="0" err="1">
+                <a:latin typeface="Consolas" panose="020B0609020204030204" pitchFamily="49" charset="0"/>
+              </a:rPr>
+              <a:t>System.out.println</a:t>
+            </a:r>
+            <a:r>
+              <a:rPr lang="it-IT" sz="4800" dirty="0">
+                <a:latin typeface="Consolas" panose="020B0609020204030204" pitchFamily="49" charset="0"/>
+              </a:rPr>
+              <a:t>("</a:t>
+            </a:r>
+            <a:r>
+              <a:rPr lang="it-IT" sz="4800" dirty="0" err="1">
+                <a:latin typeface="Consolas" panose="020B0609020204030204" pitchFamily="49" charset="0"/>
+              </a:rPr>
+              <a:t>RowSwap</a:t>
+            </a:r>
+            <a:r>
+              <a:rPr lang="it-IT" sz="4800" dirty="0">
+                <a:latin typeface="Consolas" panose="020B0609020204030204" pitchFamily="49" charset="0"/>
+              </a:rPr>
+              <a:t>: operazione non contemplata");</a:t>
+            </a:r>
+          </a:p>
+          <a:p>
+            <a:pPr marL="0" indent="0">
+              <a:buNone/>
+            </a:pPr>
+            <a:r>
+              <a:rPr lang="it-IT" sz="4800" dirty="0">
+                <a:latin typeface="Consolas" panose="020B0609020204030204" pitchFamily="49" charset="0"/>
+              </a:rPr>
+              <a:t>	</a:t>
+            </a:r>
+            <a:r>
+              <a:rPr lang="it-IT" sz="4800" dirty="0" err="1">
+                <a:latin typeface="Consolas" panose="020B0609020204030204" pitchFamily="49" charset="0"/>
+              </a:rPr>
+              <a:t>System.exit</a:t>
+            </a:r>
+            <a:r>
+              <a:rPr lang="it-IT" sz="4800" dirty="0">
+                <a:latin typeface="Consolas" panose="020B0609020204030204" pitchFamily="49" charset="0"/>
+              </a:rPr>
+              <a:t>(11);</a:t>
+            </a:r>
+          </a:p>
+          <a:p>
+            <a:pPr marL="0" indent="0">
+              <a:buNone/>
+            </a:pPr>
+            <a:r>
+              <a:rPr lang="it-IT" sz="4800" dirty="0">
                 <a:latin typeface="Consolas" panose="020B0609020204030204" pitchFamily="49" charset="0"/>
               </a:rPr>
               <a:t>}</a:t>
@@ -4296,7 +4503,7 @@
         </p:nvSpPr>
         <p:spPr>
           <a:xfrm>
-            <a:off x="6714460" y="4839289"/>
+            <a:off x="7167466" y="3429000"/>
             <a:ext cx="4364665" cy="1286539"/>
           </a:xfrm>
           <a:prstGeom prst="roundRect">

</xml_diff>